<commit_message>
update. converted pdf file of current results (QC)
</commit_message>
<xml_diff>
--- a/Data/EXO/OngoingCollectionofresults.pptx
+++ b/Data/EXO/OngoingCollectionofresults.pptx
@@ -12,7 +12,7 @@
     <p:sldId id="257" r:id="rId3"/>
   </p:sldIdLst>
   <p:sldSz cx="12192000" cy="6858000"/>
-  <p:notesSz cx="6858000" cy="9144000"/>
+  <p:notesSz cx="6884988" cy="10018713"/>
   <p:defaultTextStyle>
     <a:defPPr>
       <a:defRPr lang="en-US"/>
@@ -108,6 +108,11 @@
       </a:defRPr>
     </a:lvl9pPr>
   </p:defaultTextStyle>
+  <p:extLst>
+    <p:ext uri="{EFAFB233-063F-42B5-8137-9DF3F51BA10A}">
+      <p15:sldGuideLst xmlns:p15="http://schemas.microsoft.com/office/powerpoint/2012/main"/>
+    </p:ext>
+  </p:extLst>
 </p:presentation>
 </file>
 
@@ -146,17 +151,17 @@
         <p:spPr>
           <a:xfrm>
             <a:off x="0" y="0"/>
-            <a:ext cx="2971800" cy="458788"/>
+            <a:ext cx="2983495" cy="502676"/>
           </a:xfrm>
           <a:prstGeom prst="rect">
             <a:avLst/>
           </a:prstGeom>
         </p:spPr>
         <p:txBody>
-          <a:bodyPr vert="horz" lIns="91440" tIns="45720" rIns="91440" bIns="45720" rtlCol="0"/>
+          <a:bodyPr vert="horz" lIns="96588" tIns="48294" rIns="96588" bIns="48294" rtlCol="0"/>
           <a:lstStyle>
             <a:lvl1pPr algn="l">
-              <a:defRPr sz="1200"/>
+              <a:defRPr sz="1300"/>
             </a:lvl1pPr>
           </a:lstStyle>
           <a:p>
@@ -176,18 +181,18 @@
         </p:nvSpPr>
         <p:spPr>
           <a:xfrm>
-            <a:off x="3884613" y="0"/>
-            <a:ext cx="2971800" cy="458788"/>
+            <a:off x="3899900" y="0"/>
+            <a:ext cx="2983495" cy="502676"/>
           </a:xfrm>
           <a:prstGeom prst="rect">
             <a:avLst/>
           </a:prstGeom>
         </p:spPr>
         <p:txBody>
-          <a:bodyPr vert="horz" lIns="91440" tIns="45720" rIns="91440" bIns="45720" rtlCol="0"/>
+          <a:bodyPr vert="horz" lIns="96588" tIns="48294" rIns="96588" bIns="48294" rtlCol="0"/>
           <a:lstStyle>
             <a:lvl1pPr algn="r">
-              <a:defRPr sz="1200"/>
+              <a:defRPr sz="1300"/>
             </a:lvl1pPr>
           </a:lstStyle>
           <a:p>
@@ -211,8 +216,8 @@
         </p:nvSpPr>
         <p:spPr>
           <a:xfrm>
-            <a:off x="685800" y="1143000"/>
-            <a:ext cx="5486400" cy="3086100"/>
+            <a:off x="438150" y="1252538"/>
+            <a:ext cx="6008688" cy="3381375"/>
           </a:xfrm>
           <a:prstGeom prst="rect">
             <a:avLst/>
@@ -225,7 +230,7 @@
           </a:ln>
         </p:spPr>
         <p:txBody>
-          <a:bodyPr vert="horz" lIns="91440" tIns="45720" rIns="91440" bIns="45720" rtlCol="0" anchor="ctr"/>
+          <a:bodyPr vert="horz" lIns="96588" tIns="48294" rIns="96588" bIns="48294" rtlCol="0" anchor="ctr"/>
           <a:lstStyle/>
           <a:p>
             <a:endParaRPr lang="en-AU"/>
@@ -244,15 +249,15 @@
         </p:nvSpPr>
         <p:spPr>
           <a:xfrm>
-            <a:off x="685800" y="4400550"/>
-            <a:ext cx="5486400" cy="3600450"/>
+            <a:off x="688499" y="4821506"/>
+            <a:ext cx="5507990" cy="3944868"/>
           </a:xfrm>
           <a:prstGeom prst="rect">
             <a:avLst/>
           </a:prstGeom>
         </p:spPr>
         <p:txBody>
-          <a:bodyPr vert="horz" lIns="91440" tIns="45720" rIns="91440" bIns="45720" rtlCol="0"/>
+          <a:bodyPr vert="horz" lIns="96588" tIns="48294" rIns="96588" bIns="48294" rtlCol="0"/>
           <a:lstStyle/>
           <a:p>
             <a:pPr lvl="0"/>
@@ -304,18 +309,18 @@
         </p:nvSpPr>
         <p:spPr>
           <a:xfrm>
-            <a:off x="0" y="8685213"/>
-            <a:ext cx="2971800" cy="458787"/>
+            <a:off x="0" y="9516039"/>
+            <a:ext cx="2983495" cy="502674"/>
           </a:xfrm>
           <a:prstGeom prst="rect">
             <a:avLst/>
           </a:prstGeom>
         </p:spPr>
         <p:txBody>
-          <a:bodyPr vert="horz" lIns="91440" tIns="45720" rIns="91440" bIns="45720" rtlCol="0" anchor="b"/>
+          <a:bodyPr vert="horz" lIns="96588" tIns="48294" rIns="96588" bIns="48294" rtlCol="0" anchor="b"/>
           <a:lstStyle>
             <a:lvl1pPr algn="l">
-              <a:defRPr sz="1200"/>
+              <a:defRPr sz="1300"/>
             </a:lvl1pPr>
           </a:lstStyle>
           <a:p>
@@ -335,18 +340,18 @@
         </p:nvSpPr>
         <p:spPr>
           <a:xfrm>
-            <a:off x="3884613" y="8685213"/>
-            <a:ext cx="2971800" cy="458787"/>
+            <a:off x="3899900" y="9516039"/>
+            <a:ext cx="2983495" cy="502674"/>
           </a:xfrm>
           <a:prstGeom prst="rect">
             <a:avLst/>
           </a:prstGeom>
         </p:spPr>
         <p:txBody>
-          <a:bodyPr vert="horz" lIns="91440" tIns="45720" rIns="91440" bIns="45720" rtlCol="0" anchor="b"/>
+          <a:bodyPr vert="horz" lIns="96588" tIns="48294" rIns="96588" bIns="48294" rtlCol="0" anchor="b"/>
           <a:lstStyle>
             <a:lvl1pPr algn="r">
-              <a:defRPr sz="1200"/>
+              <a:defRPr sz="1300"/>
             </a:lvl1pPr>
           </a:lstStyle>
           <a:p>
@@ -3563,7 +3568,7 @@
           <p:nvPr/>
         </p:nvPicPr>
         <p:blipFill>
-          <a:blip r:embed="rId3">
+          <a:blip r:embed="rId3" cstate="print">
             <a:extLst>
               <a:ext uri="{28A0092B-C50C-407E-A947-70E740481C1C}">
                 <a14:useLocalDpi xmlns:a14="http://schemas.microsoft.com/office/drawing/2010/main" val="0"/>
@@ -3576,8 +3581,8 @@
         </p:blipFill>
         <p:spPr>
           <a:xfrm>
-            <a:off x="-497457" y="0"/>
-            <a:ext cx="6688142" cy="6858000"/>
+            <a:off x="957263" y="185737"/>
+            <a:ext cx="3600000" cy="3691428"/>
           </a:xfrm>
           <a:prstGeom prst="rect">
             <a:avLst/>
@@ -3606,8 +3611,8 @@
         </p:blipFill>
         <p:spPr>
           <a:xfrm>
-            <a:off x="6509657" y="310242"/>
-            <a:ext cx="5682343" cy="5682343"/>
+            <a:off x="5080907" y="277165"/>
+            <a:ext cx="3600000" cy="3600000"/>
           </a:xfrm>
           <a:prstGeom prst="rect">
             <a:avLst/>
@@ -3653,7 +3658,7 @@
           <p:nvPr/>
         </p:nvPicPr>
         <p:blipFill>
-          <a:blip r:embed="rId3">
+          <a:blip r:embed="rId3" cstate="print">
             <a:extLst>
               <a:ext uri="{28A0092B-C50C-407E-A947-70E740481C1C}">
                 <a14:useLocalDpi xmlns:a14="http://schemas.microsoft.com/office/drawing/2010/main" val="0"/>
@@ -3666,8 +3671,8 @@
         </p:blipFill>
         <p:spPr>
           <a:xfrm>
-            <a:off x="-150232" y="0"/>
-            <a:ext cx="6483549" cy="6858000"/>
+            <a:off x="2092905" y="1273853"/>
+            <a:ext cx="3536370" cy="3740609"/>
           </a:xfrm>
           <a:prstGeom prst="rect">
             <a:avLst/>
@@ -3696,8 +3701,8 @@
         </p:blipFill>
         <p:spPr>
           <a:xfrm>
-            <a:off x="6333317" y="971550"/>
-            <a:ext cx="4914900" cy="4914900"/>
+            <a:off x="6590492" y="1000125"/>
+            <a:ext cx="3600000" cy="3600000"/>
           </a:xfrm>
           <a:prstGeom prst="rect">
             <a:avLst/>

</xml_diff>

<commit_message>
work from 2/2/16, lumi/edger analysis of hek and pc exo data
</commit_message>
<xml_diff>
--- a/Data/EXO/OngoingCollectionofresults.pptx
+++ b/Data/EXO/OngoingCollectionofresults.pptx
@@ -108,6 +108,11 @@
       </a:defRPr>
     </a:lvl9pPr>
   </p:defaultTextStyle>
+  <p:extLst>
+    <p:ext uri="{EFAFB233-063F-42B5-8137-9DF3F51BA10A}">
+      <p15:sldGuideLst xmlns:p15="http://schemas.microsoft.com/office/powerpoint/2012/main"/>
+    </p:ext>
+  </p:extLst>
 </p:presentation>
 </file>
 
@@ -193,7 +198,7 @@
           <a:p>
             <a:fld id="{B817A5FE-EECF-4185-9476-5DEE16837918}" type="datetimeFigureOut">
               <a:rPr lang="en-AU" smtClean="0"/>
-              <a:t>1/02/2016</a:t>
+              <a:t>2/02/2016</a:t>
             </a:fld>
             <a:endParaRPr lang="en-AU"/>
           </a:p>
@@ -828,7 +833,7 @@
           <a:p>
             <a:fld id="{A3C1995D-4FFA-4004-9C55-329B9145134D}" type="datetimeFigureOut">
               <a:rPr lang="en-AU" smtClean="0"/>
-              <a:t>1/02/2016</a:t>
+              <a:t>2/02/2016</a:t>
             </a:fld>
             <a:endParaRPr lang="en-AU"/>
           </a:p>
@@ -998,7 +1003,7 @@
           <a:p>
             <a:fld id="{A3C1995D-4FFA-4004-9C55-329B9145134D}" type="datetimeFigureOut">
               <a:rPr lang="en-AU" smtClean="0"/>
-              <a:t>1/02/2016</a:t>
+              <a:t>2/02/2016</a:t>
             </a:fld>
             <a:endParaRPr lang="en-AU"/>
           </a:p>
@@ -1178,7 +1183,7 @@
           <a:p>
             <a:fld id="{A3C1995D-4FFA-4004-9C55-329B9145134D}" type="datetimeFigureOut">
               <a:rPr lang="en-AU" smtClean="0"/>
-              <a:t>1/02/2016</a:t>
+              <a:t>2/02/2016</a:t>
             </a:fld>
             <a:endParaRPr lang="en-AU"/>
           </a:p>
@@ -1348,7 +1353,7 @@
           <a:p>
             <a:fld id="{A3C1995D-4FFA-4004-9C55-329B9145134D}" type="datetimeFigureOut">
               <a:rPr lang="en-AU" smtClean="0"/>
-              <a:t>1/02/2016</a:t>
+              <a:t>2/02/2016</a:t>
             </a:fld>
             <a:endParaRPr lang="en-AU"/>
           </a:p>
@@ -1594,7 +1599,7 @@
           <a:p>
             <a:fld id="{A3C1995D-4FFA-4004-9C55-329B9145134D}" type="datetimeFigureOut">
               <a:rPr lang="en-AU" smtClean="0"/>
-              <a:t>1/02/2016</a:t>
+              <a:t>2/02/2016</a:t>
             </a:fld>
             <a:endParaRPr lang="en-AU"/>
           </a:p>
@@ -1826,7 +1831,7 @@
           <a:p>
             <a:fld id="{A3C1995D-4FFA-4004-9C55-329B9145134D}" type="datetimeFigureOut">
               <a:rPr lang="en-AU" smtClean="0"/>
-              <a:t>1/02/2016</a:t>
+              <a:t>2/02/2016</a:t>
             </a:fld>
             <a:endParaRPr lang="en-AU"/>
           </a:p>
@@ -2193,7 +2198,7 @@
           <a:p>
             <a:fld id="{A3C1995D-4FFA-4004-9C55-329B9145134D}" type="datetimeFigureOut">
               <a:rPr lang="en-AU" smtClean="0"/>
-              <a:t>1/02/2016</a:t>
+              <a:t>2/02/2016</a:t>
             </a:fld>
             <a:endParaRPr lang="en-AU"/>
           </a:p>
@@ -2311,7 +2316,7 @@
           <a:p>
             <a:fld id="{A3C1995D-4FFA-4004-9C55-329B9145134D}" type="datetimeFigureOut">
               <a:rPr lang="en-AU" smtClean="0"/>
-              <a:t>1/02/2016</a:t>
+              <a:t>2/02/2016</a:t>
             </a:fld>
             <a:endParaRPr lang="en-AU"/>
           </a:p>
@@ -2406,7 +2411,7 @@
           <a:p>
             <a:fld id="{A3C1995D-4FFA-4004-9C55-329B9145134D}" type="datetimeFigureOut">
               <a:rPr lang="en-AU" smtClean="0"/>
-              <a:t>1/02/2016</a:t>
+              <a:t>2/02/2016</a:t>
             </a:fld>
             <a:endParaRPr lang="en-AU"/>
           </a:p>
@@ -2683,7 +2688,7 @@
           <a:p>
             <a:fld id="{A3C1995D-4FFA-4004-9C55-329B9145134D}" type="datetimeFigureOut">
               <a:rPr lang="en-AU" smtClean="0"/>
-              <a:t>1/02/2016</a:t>
+              <a:t>2/02/2016</a:t>
             </a:fld>
             <a:endParaRPr lang="en-AU"/>
           </a:p>
@@ -2936,7 +2941,7 @@
           <a:p>
             <a:fld id="{A3C1995D-4FFA-4004-9C55-329B9145134D}" type="datetimeFigureOut">
               <a:rPr lang="en-AU" smtClean="0"/>
-              <a:t>1/02/2016</a:t>
+              <a:t>2/02/2016</a:t>
             </a:fld>
             <a:endParaRPr lang="en-AU"/>
           </a:p>
@@ -3149,7 +3154,7 @@
           <a:p>
             <a:fld id="{A3C1995D-4FFA-4004-9C55-329B9145134D}" type="datetimeFigureOut">
               <a:rPr lang="en-AU" smtClean="0"/>
-              <a:t>1/02/2016</a:t>
+              <a:t>2/02/2016</a:t>
             </a:fld>
             <a:endParaRPr lang="en-AU"/>
           </a:p>
@@ -3586,7 +3591,7 @@
       </p:pic>
       <p:pic>
         <p:nvPicPr>
-          <p:cNvPr id="5" name="Picture 4"/>
+          <p:cNvPr id="2" name="Picture 1"/>
           <p:cNvPicPr>
             <a:picLocks noChangeAspect="1"/>
           </p:cNvPicPr>
@@ -3606,8 +3611,8 @@
         </p:blipFill>
         <p:spPr>
           <a:xfrm>
-            <a:off x="6509657" y="310242"/>
-            <a:ext cx="5682343" cy="5682343"/>
+            <a:off x="7285894" y="1365955"/>
+            <a:ext cx="4014855" cy="3600000"/>
           </a:xfrm>
           <a:prstGeom prst="rect">
             <a:avLst/>

</xml_diff>

<commit_message>
3/2/16. DESeq analysis of hek and PC
</commit_message>
<xml_diff>
--- a/Data/EXO/OngoingCollectionofresults.pptx
+++ b/Data/EXO/OngoingCollectionofresults.pptx
@@ -5,11 +5,12 @@
     <p:sldMasterId id="2147483648" r:id="rId1"/>
   </p:sldMasterIdLst>
   <p:notesMasterIdLst>
-    <p:notesMasterId r:id="rId4"/>
+    <p:notesMasterId r:id="rId5"/>
   </p:notesMasterIdLst>
   <p:sldIdLst>
     <p:sldId id="256" r:id="rId2"/>
     <p:sldId id="257" r:id="rId3"/>
+    <p:sldId id="258" r:id="rId4"/>
   </p:sldIdLst>
   <p:sldSz cx="12192000" cy="6858000"/>
   <p:notesSz cx="6858000" cy="9144000"/>
@@ -198,7 +199,7 @@
           <a:p>
             <a:fld id="{B817A5FE-EECF-4185-9476-5DEE16837918}" type="datetimeFigureOut">
               <a:rPr lang="en-AU" smtClean="0"/>
-              <a:t>2/02/2016</a:t>
+              <a:t>3/02/2016</a:t>
             </a:fld>
             <a:endParaRPr lang="en-AU"/>
           </a:p>
@@ -702,6 +703,106 @@
 </p:notes>
 </file>
 
+<file path=ppt/notesSlides/notesSlide3.xml><?xml version="1.0" encoding="utf-8"?>
+<p:notes xmlns:a="http://schemas.openxmlformats.org/drawingml/2006/main" xmlns:r="http://schemas.openxmlformats.org/officeDocument/2006/relationships" xmlns:p="http://schemas.openxmlformats.org/presentationml/2006/main">
+  <p:cSld>
+    <p:spTree>
+      <p:nvGrpSpPr>
+        <p:cNvPr id="1" name=""/>
+        <p:cNvGrpSpPr/>
+        <p:nvPr/>
+      </p:nvGrpSpPr>
+      <p:grpSpPr>
+        <a:xfrm>
+          <a:off x="0" y="0"/>
+          <a:ext cx="0" cy="0"/>
+          <a:chOff x="0" y="0"/>
+          <a:chExt cx="0" cy="0"/>
+        </a:xfrm>
+      </p:grpSpPr>
+      <p:sp>
+        <p:nvSpPr>
+          <p:cNvPr id="2" name="Slide Image Placeholder 1"/>
+          <p:cNvSpPr>
+            <a:spLocks noGrp="1" noRot="1" noChangeAspect="1"/>
+          </p:cNvSpPr>
+          <p:nvPr>
+            <p:ph type="sldImg"/>
+          </p:nvPr>
+        </p:nvSpPr>
+        <p:spPr/>
+      </p:sp>
+      <p:sp>
+        <p:nvSpPr>
+          <p:cNvPr id="3" name="Notes Placeholder 2"/>
+          <p:cNvSpPr>
+            <a:spLocks noGrp="1"/>
+          </p:cNvSpPr>
+          <p:nvPr>
+            <p:ph type="body" idx="1"/>
+          </p:nvPr>
+        </p:nvSpPr>
+        <p:spPr/>
+        <p:txBody>
+          <a:bodyPr/>
+          <a:lstStyle/>
+          <a:p>
+            <a:r>
+              <a:rPr lang="en-US" dirty="0" err="1" smtClean="0"/>
+              <a:t>DESeq</a:t>
+            </a:r>
+            <a:r>
+              <a:rPr lang="en-US" baseline="0" dirty="0" smtClean="0"/>
+              <a:t> Analysis of PC3 cells. Top: PCA plots, </a:t>
+            </a:r>
+            <a:r>
+              <a:rPr lang="en-US" baseline="0" dirty="0" err="1" smtClean="0"/>
+              <a:t>cavin</a:t>
+            </a:r>
+            <a:r>
+              <a:rPr lang="en-US" baseline="0" dirty="0" smtClean="0"/>
+              <a:t> 1, 2 and 3 respectively. No including MA plots because they are too messy. </a:t>
+            </a:r>
+            <a:endParaRPr lang="en-AU" dirty="0"/>
+          </a:p>
+        </p:txBody>
+      </p:sp>
+      <p:sp>
+        <p:nvSpPr>
+          <p:cNvPr id="4" name="Slide Number Placeholder 3"/>
+          <p:cNvSpPr>
+            <a:spLocks noGrp="1"/>
+          </p:cNvSpPr>
+          <p:nvPr>
+            <p:ph type="sldNum" sz="quarter" idx="10"/>
+          </p:nvPr>
+        </p:nvSpPr>
+        <p:spPr/>
+        <p:txBody>
+          <a:bodyPr/>
+          <a:lstStyle/>
+          <a:p>
+            <a:fld id="{D171A5B8-A513-496B-BA19-E22DF82761BC}" type="slidenum">
+              <a:rPr lang="en-AU" smtClean="0"/>
+              <a:t>3</a:t>
+            </a:fld>
+            <a:endParaRPr lang="en-AU"/>
+          </a:p>
+        </p:txBody>
+      </p:sp>
+    </p:spTree>
+    <p:extLst>
+      <p:ext uri="{BB962C8B-B14F-4D97-AF65-F5344CB8AC3E}">
+        <p14:creationId xmlns:p14="http://schemas.microsoft.com/office/powerpoint/2010/main" val="2357100350"/>
+      </p:ext>
+    </p:extLst>
+  </p:cSld>
+  <p:clrMapOvr>
+    <a:masterClrMapping/>
+  </p:clrMapOvr>
+</p:notes>
+</file>
+
 <file path=ppt/slideLayouts/slideLayout1.xml><?xml version="1.0" encoding="utf-8"?>
 <p:sldLayout xmlns:a="http://schemas.openxmlformats.org/drawingml/2006/main" xmlns:r="http://schemas.openxmlformats.org/officeDocument/2006/relationships" xmlns:p="http://schemas.openxmlformats.org/presentationml/2006/main" type="title" preserve="1">
   <p:cSld name="Title Slide">
@@ -833,7 +934,7 @@
           <a:p>
             <a:fld id="{A3C1995D-4FFA-4004-9C55-329B9145134D}" type="datetimeFigureOut">
               <a:rPr lang="en-AU" smtClean="0"/>
-              <a:t>2/02/2016</a:t>
+              <a:t>3/02/2016</a:t>
             </a:fld>
             <a:endParaRPr lang="en-AU"/>
           </a:p>
@@ -1003,7 +1104,7 @@
           <a:p>
             <a:fld id="{A3C1995D-4FFA-4004-9C55-329B9145134D}" type="datetimeFigureOut">
               <a:rPr lang="en-AU" smtClean="0"/>
-              <a:t>2/02/2016</a:t>
+              <a:t>3/02/2016</a:t>
             </a:fld>
             <a:endParaRPr lang="en-AU"/>
           </a:p>
@@ -1183,7 +1284,7 @@
           <a:p>
             <a:fld id="{A3C1995D-4FFA-4004-9C55-329B9145134D}" type="datetimeFigureOut">
               <a:rPr lang="en-AU" smtClean="0"/>
-              <a:t>2/02/2016</a:t>
+              <a:t>3/02/2016</a:t>
             </a:fld>
             <a:endParaRPr lang="en-AU"/>
           </a:p>
@@ -1353,7 +1454,7 @@
           <a:p>
             <a:fld id="{A3C1995D-4FFA-4004-9C55-329B9145134D}" type="datetimeFigureOut">
               <a:rPr lang="en-AU" smtClean="0"/>
-              <a:t>2/02/2016</a:t>
+              <a:t>3/02/2016</a:t>
             </a:fld>
             <a:endParaRPr lang="en-AU"/>
           </a:p>
@@ -1599,7 +1700,7 @@
           <a:p>
             <a:fld id="{A3C1995D-4FFA-4004-9C55-329B9145134D}" type="datetimeFigureOut">
               <a:rPr lang="en-AU" smtClean="0"/>
-              <a:t>2/02/2016</a:t>
+              <a:t>3/02/2016</a:t>
             </a:fld>
             <a:endParaRPr lang="en-AU"/>
           </a:p>
@@ -1831,7 +1932,7 @@
           <a:p>
             <a:fld id="{A3C1995D-4FFA-4004-9C55-329B9145134D}" type="datetimeFigureOut">
               <a:rPr lang="en-AU" smtClean="0"/>
-              <a:t>2/02/2016</a:t>
+              <a:t>3/02/2016</a:t>
             </a:fld>
             <a:endParaRPr lang="en-AU"/>
           </a:p>
@@ -2198,7 +2299,7 @@
           <a:p>
             <a:fld id="{A3C1995D-4FFA-4004-9C55-329B9145134D}" type="datetimeFigureOut">
               <a:rPr lang="en-AU" smtClean="0"/>
-              <a:t>2/02/2016</a:t>
+              <a:t>3/02/2016</a:t>
             </a:fld>
             <a:endParaRPr lang="en-AU"/>
           </a:p>
@@ -2316,7 +2417,7 @@
           <a:p>
             <a:fld id="{A3C1995D-4FFA-4004-9C55-329B9145134D}" type="datetimeFigureOut">
               <a:rPr lang="en-AU" smtClean="0"/>
-              <a:t>2/02/2016</a:t>
+              <a:t>3/02/2016</a:t>
             </a:fld>
             <a:endParaRPr lang="en-AU"/>
           </a:p>
@@ -2411,7 +2512,7 @@
           <a:p>
             <a:fld id="{A3C1995D-4FFA-4004-9C55-329B9145134D}" type="datetimeFigureOut">
               <a:rPr lang="en-AU" smtClean="0"/>
-              <a:t>2/02/2016</a:t>
+              <a:t>3/02/2016</a:t>
             </a:fld>
             <a:endParaRPr lang="en-AU"/>
           </a:p>
@@ -2688,7 +2789,7 @@
           <a:p>
             <a:fld id="{A3C1995D-4FFA-4004-9C55-329B9145134D}" type="datetimeFigureOut">
               <a:rPr lang="en-AU" smtClean="0"/>
-              <a:t>2/02/2016</a:t>
+              <a:t>3/02/2016</a:t>
             </a:fld>
             <a:endParaRPr lang="en-AU"/>
           </a:p>
@@ -2941,7 +3042,7 @@
           <a:p>
             <a:fld id="{A3C1995D-4FFA-4004-9C55-329B9145134D}" type="datetimeFigureOut">
               <a:rPr lang="en-AU" smtClean="0"/>
-              <a:t>2/02/2016</a:t>
+              <a:t>3/02/2016</a:t>
             </a:fld>
             <a:endParaRPr lang="en-AU"/>
           </a:p>
@@ -3154,7 +3255,7 @@
           <a:p>
             <a:fld id="{A3C1995D-4FFA-4004-9C55-329B9145134D}" type="datetimeFigureOut">
               <a:rPr lang="en-AU" smtClean="0"/>
-              <a:t>2/02/2016</a:t>
+              <a:t>3/02/2016</a:t>
             </a:fld>
             <a:endParaRPr lang="en-AU"/>
           </a:p>
@@ -3713,6 +3814,126 @@
     <p:extLst>
       <p:ext uri="{BB962C8B-B14F-4D97-AF65-F5344CB8AC3E}">
         <p14:creationId xmlns:p14="http://schemas.microsoft.com/office/powerpoint/2010/main" val="3903568395"/>
+      </p:ext>
+    </p:extLst>
+  </p:cSld>
+  <p:clrMapOvr>
+    <a:masterClrMapping/>
+  </p:clrMapOvr>
+</p:sld>
+</file>
+
+<file path=ppt/slides/slide3.xml><?xml version="1.0" encoding="utf-8"?>
+<p:sld xmlns:a="http://schemas.openxmlformats.org/drawingml/2006/main" xmlns:r="http://schemas.openxmlformats.org/officeDocument/2006/relationships" xmlns:p="http://schemas.openxmlformats.org/presentationml/2006/main">
+  <p:cSld>
+    <p:spTree>
+      <p:nvGrpSpPr>
+        <p:cNvPr id="1" name=""/>
+        <p:cNvGrpSpPr/>
+        <p:nvPr/>
+      </p:nvGrpSpPr>
+      <p:grpSpPr>
+        <a:xfrm>
+          <a:off x="0" y="0"/>
+          <a:ext cx="0" cy="0"/>
+          <a:chOff x="0" y="0"/>
+          <a:chExt cx="0" cy="0"/>
+        </a:xfrm>
+      </p:grpSpPr>
+      <p:pic>
+        <p:nvPicPr>
+          <p:cNvPr id="2" name="Picture 1"/>
+          <p:cNvPicPr>
+            <a:picLocks noChangeAspect="1"/>
+          </p:cNvPicPr>
+          <p:nvPr/>
+        </p:nvPicPr>
+        <p:blipFill>
+          <a:blip r:embed="rId3">
+            <a:extLst>
+              <a:ext uri="{28A0092B-C50C-407E-A947-70E740481C1C}">
+                <a14:useLocalDpi xmlns:a14="http://schemas.microsoft.com/office/drawing/2010/main" val="0"/>
+              </a:ext>
+            </a:extLst>
+          </a:blip>
+          <a:stretch>
+            <a:fillRect/>
+          </a:stretch>
+        </p:blipFill>
+        <p:spPr>
+          <a:xfrm>
+            <a:off x="6581230" y="-307304"/>
+            <a:ext cx="2653211" cy="3698203"/>
+          </a:xfrm>
+          <a:prstGeom prst="rect">
+            <a:avLst/>
+          </a:prstGeom>
+        </p:spPr>
+      </p:pic>
+      <p:pic>
+        <p:nvPicPr>
+          <p:cNvPr id="3" name="Picture 2"/>
+          <p:cNvPicPr>
+            <a:picLocks noChangeAspect="1"/>
+          </p:cNvPicPr>
+          <p:nvPr/>
+        </p:nvPicPr>
+        <p:blipFill>
+          <a:blip r:embed="rId4">
+            <a:extLst>
+              <a:ext uri="{28A0092B-C50C-407E-A947-70E740481C1C}">
+                <a14:useLocalDpi xmlns:a14="http://schemas.microsoft.com/office/drawing/2010/main" val="0"/>
+              </a:ext>
+            </a:extLst>
+          </a:blip>
+          <a:stretch>
+            <a:fillRect/>
+          </a:stretch>
+        </p:blipFill>
+        <p:spPr>
+          <a:xfrm>
+            <a:off x="3521005" y="248400"/>
+            <a:ext cx="2520000" cy="2520000"/>
+          </a:xfrm>
+          <a:prstGeom prst="rect">
+            <a:avLst/>
+          </a:prstGeom>
+        </p:spPr>
+      </p:pic>
+      <p:pic>
+        <p:nvPicPr>
+          <p:cNvPr id="4" name="Picture 3"/>
+          <p:cNvPicPr>
+            <a:picLocks noChangeAspect="1"/>
+          </p:cNvPicPr>
+          <p:nvPr/>
+        </p:nvPicPr>
+        <p:blipFill>
+          <a:blip r:embed="rId5">
+            <a:extLst>
+              <a:ext uri="{28A0092B-C50C-407E-A947-70E740481C1C}">
+                <a14:useLocalDpi xmlns:a14="http://schemas.microsoft.com/office/drawing/2010/main" val="0"/>
+              </a:ext>
+            </a:extLst>
+          </a:blip>
+          <a:stretch>
+            <a:fillRect/>
+          </a:stretch>
+        </p:blipFill>
+        <p:spPr>
+          <a:xfrm>
+            <a:off x="906837" y="248400"/>
+            <a:ext cx="2520000" cy="2520000"/>
+          </a:xfrm>
+          <a:prstGeom prst="rect">
+            <a:avLst/>
+          </a:prstGeom>
+        </p:spPr>
+      </p:pic>
+    </p:spTree>
+    <p:extLst>
+      <p:ext uri="{BB962C8B-B14F-4D97-AF65-F5344CB8AC3E}">
+        <p14:creationId xmlns:p14="http://schemas.microsoft.com/office/powerpoint/2010/main" val="1386366249"/>
       </p:ext>
     </p:extLst>
   </p:cSld>

</xml_diff>

<commit_message>
update of results for printing
</commit_message>
<xml_diff>
--- a/Data/EXO/OngoingCollectionofresults.pptx
+++ b/Data/EXO/OngoingCollectionofresults.pptx
@@ -5,12 +5,13 @@
     <p:sldMasterId id="2147483648" r:id="rId1"/>
   </p:sldMasterIdLst>
   <p:notesMasterIdLst>
-    <p:notesMasterId r:id="rId5"/>
+    <p:notesMasterId r:id="rId6"/>
   </p:notesMasterIdLst>
   <p:sldIdLst>
     <p:sldId id="256" r:id="rId2"/>
     <p:sldId id="257" r:id="rId3"/>
     <p:sldId id="258" r:id="rId4"/>
+    <p:sldId id="259" r:id="rId5"/>
   </p:sldIdLst>
   <p:sldSz cx="12192000" cy="6858000"/>
   <p:notesSz cx="6858000" cy="9144000"/>
@@ -199,7 +200,7 @@
           <a:p>
             <a:fld id="{B817A5FE-EECF-4185-9476-5DEE16837918}" type="datetimeFigureOut">
               <a:rPr lang="en-AU" smtClean="0"/>
-              <a:t>3/02/2016</a:t>
+              <a:t>5/02/2016</a:t>
             </a:fld>
             <a:endParaRPr lang="en-AU"/>
           </a:p>
@@ -803,6 +804,106 @@
 </p:notes>
 </file>
 
+<file path=ppt/notesSlides/notesSlide4.xml><?xml version="1.0" encoding="utf-8"?>
+<p:notes xmlns:a="http://schemas.openxmlformats.org/drawingml/2006/main" xmlns:r="http://schemas.openxmlformats.org/officeDocument/2006/relationships" xmlns:p="http://schemas.openxmlformats.org/presentationml/2006/main">
+  <p:cSld>
+    <p:spTree>
+      <p:nvGrpSpPr>
+        <p:cNvPr id="1" name=""/>
+        <p:cNvGrpSpPr/>
+        <p:nvPr/>
+      </p:nvGrpSpPr>
+      <p:grpSpPr>
+        <a:xfrm>
+          <a:off x="0" y="0"/>
+          <a:ext cx="0" cy="0"/>
+          <a:chOff x="0" y="0"/>
+          <a:chExt cx="0" cy="0"/>
+        </a:xfrm>
+      </p:grpSpPr>
+      <p:sp>
+        <p:nvSpPr>
+          <p:cNvPr id="2" name="Slide Image Placeholder 1"/>
+          <p:cNvSpPr>
+            <a:spLocks noGrp="1" noRot="1" noChangeAspect="1"/>
+          </p:cNvSpPr>
+          <p:nvPr>
+            <p:ph type="sldImg"/>
+          </p:nvPr>
+        </p:nvSpPr>
+        <p:spPr/>
+      </p:sp>
+      <p:sp>
+        <p:nvSpPr>
+          <p:cNvPr id="3" name="Notes Placeholder 2"/>
+          <p:cNvSpPr>
+            <a:spLocks noGrp="1"/>
+          </p:cNvSpPr>
+          <p:nvPr>
+            <p:ph type="body" idx="1"/>
+          </p:nvPr>
+        </p:nvSpPr>
+        <p:spPr/>
+        <p:txBody>
+          <a:bodyPr/>
+          <a:lstStyle/>
+          <a:p>
+            <a:r>
+              <a:rPr lang="en-AU" dirty="0" smtClean="0"/>
+              <a:t>HEK data for </a:t>
+            </a:r>
+            <a:r>
+              <a:rPr lang="en-AU" dirty="0" err="1" smtClean="0"/>
+              <a:t>DESeq</a:t>
+            </a:r>
+            <a:r>
+              <a:rPr lang="en-AU" dirty="0" smtClean="0"/>
+              <a:t>.</a:t>
+            </a:r>
+            <a:r>
+              <a:rPr lang="en-AU" baseline="0" dirty="0" smtClean="0"/>
+              <a:t> MA plots. CAV1, cav2, cav3, caveolincav1, cav2 cav3. </a:t>
+            </a:r>
+            <a:endParaRPr lang="en-AU" dirty="0"/>
+          </a:p>
+        </p:txBody>
+      </p:sp>
+      <p:sp>
+        <p:nvSpPr>
+          <p:cNvPr id="4" name="Slide Number Placeholder 3"/>
+          <p:cNvSpPr>
+            <a:spLocks noGrp="1"/>
+          </p:cNvSpPr>
+          <p:nvPr>
+            <p:ph type="sldNum" sz="quarter" idx="10"/>
+          </p:nvPr>
+        </p:nvSpPr>
+        <p:spPr/>
+        <p:txBody>
+          <a:bodyPr/>
+          <a:lstStyle/>
+          <a:p>
+            <a:fld id="{D171A5B8-A513-496B-BA19-E22DF82761BC}" type="slidenum">
+              <a:rPr lang="en-AU" smtClean="0"/>
+              <a:t>4</a:t>
+            </a:fld>
+            <a:endParaRPr lang="en-AU"/>
+          </a:p>
+        </p:txBody>
+      </p:sp>
+    </p:spTree>
+    <p:extLst>
+      <p:ext uri="{BB962C8B-B14F-4D97-AF65-F5344CB8AC3E}">
+        <p14:creationId xmlns:p14="http://schemas.microsoft.com/office/powerpoint/2010/main" val="4247760398"/>
+      </p:ext>
+    </p:extLst>
+  </p:cSld>
+  <p:clrMapOvr>
+    <a:masterClrMapping/>
+  </p:clrMapOvr>
+</p:notes>
+</file>
+
 <file path=ppt/slideLayouts/slideLayout1.xml><?xml version="1.0" encoding="utf-8"?>
 <p:sldLayout xmlns:a="http://schemas.openxmlformats.org/drawingml/2006/main" xmlns:r="http://schemas.openxmlformats.org/officeDocument/2006/relationships" xmlns:p="http://schemas.openxmlformats.org/presentationml/2006/main" type="title" preserve="1">
   <p:cSld name="Title Slide">
@@ -934,7 +1035,7 @@
           <a:p>
             <a:fld id="{A3C1995D-4FFA-4004-9C55-329B9145134D}" type="datetimeFigureOut">
               <a:rPr lang="en-AU" smtClean="0"/>
-              <a:t>3/02/2016</a:t>
+              <a:t>5/02/2016</a:t>
             </a:fld>
             <a:endParaRPr lang="en-AU"/>
           </a:p>
@@ -1104,7 +1205,7 @@
           <a:p>
             <a:fld id="{A3C1995D-4FFA-4004-9C55-329B9145134D}" type="datetimeFigureOut">
               <a:rPr lang="en-AU" smtClean="0"/>
-              <a:t>3/02/2016</a:t>
+              <a:t>5/02/2016</a:t>
             </a:fld>
             <a:endParaRPr lang="en-AU"/>
           </a:p>
@@ -1284,7 +1385,7 @@
           <a:p>
             <a:fld id="{A3C1995D-4FFA-4004-9C55-329B9145134D}" type="datetimeFigureOut">
               <a:rPr lang="en-AU" smtClean="0"/>
-              <a:t>3/02/2016</a:t>
+              <a:t>5/02/2016</a:t>
             </a:fld>
             <a:endParaRPr lang="en-AU"/>
           </a:p>
@@ -1454,7 +1555,7 @@
           <a:p>
             <a:fld id="{A3C1995D-4FFA-4004-9C55-329B9145134D}" type="datetimeFigureOut">
               <a:rPr lang="en-AU" smtClean="0"/>
-              <a:t>3/02/2016</a:t>
+              <a:t>5/02/2016</a:t>
             </a:fld>
             <a:endParaRPr lang="en-AU"/>
           </a:p>
@@ -1700,7 +1801,7 @@
           <a:p>
             <a:fld id="{A3C1995D-4FFA-4004-9C55-329B9145134D}" type="datetimeFigureOut">
               <a:rPr lang="en-AU" smtClean="0"/>
-              <a:t>3/02/2016</a:t>
+              <a:t>5/02/2016</a:t>
             </a:fld>
             <a:endParaRPr lang="en-AU"/>
           </a:p>
@@ -1932,7 +2033,7 @@
           <a:p>
             <a:fld id="{A3C1995D-4FFA-4004-9C55-329B9145134D}" type="datetimeFigureOut">
               <a:rPr lang="en-AU" smtClean="0"/>
-              <a:t>3/02/2016</a:t>
+              <a:t>5/02/2016</a:t>
             </a:fld>
             <a:endParaRPr lang="en-AU"/>
           </a:p>
@@ -2299,7 +2400,7 @@
           <a:p>
             <a:fld id="{A3C1995D-4FFA-4004-9C55-329B9145134D}" type="datetimeFigureOut">
               <a:rPr lang="en-AU" smtClean="0"/>
-              <a:t>3/02/2016</a:t>
+              <a:t>5/02/2016</a:t>
             </a:fld>
             <a:endParaRPr lang="en-AU"/>
           </a:p>
@@ -2417,7 +2518,7 @@
           <a:p>
             <a:fld id="{A3C1995D-4FFA-4004-9C55-329B9145134D}" type="datetimeFigureOut">
               <a:rPr lang="en-AU" smtClean="0"/>
-              <a:t>3/02/2016</a:t>
+              <a:t>5/02/2016</a:t>
             </a:fld>
             <a:endParaRPr lang="en-AU"/>
           </a:p>
@@ -2512,7 +2613,7 @@
           <a:p>
             <a:fld id="{A3C1995D-4FFA-4004-9C55-329B9145134D}" type="datetimeFigureOut">
               <a:rPr lang="en-AU" smtClean="0"/>
-              <a:t>3/02/2016</a:t>
+              <a:t>5/02/2016</a:t>
             </a:fld>
             <a:endParaRPr lang="en-AU"/>
           </a:p>
@@ -2789,7 +2890,7 @@
           <a:p>
             <a:fld id="{A3C1995D-4FFA-4004-9C55-329B9145134D}" type="datetimeFigureOut">
               <a:rPr lang="en-AU" smtClean="0"/>
-              <a:t>3/02/2016</a:t>
+              <a:t>5/02/2016</a:t>
             </a:fld>
             <a:endParaRPr lang="en-AU"/>
           </a:p>
@@ -3042,7 +3143,7 @@
           <a:p>
             <a:fld id="{A3C1995D-4FFA-4004-9C55-329B9145134D}" type="datetimeFigureOut">
               <a:rPr lang="en-AU" smtClean="0"/>
-              <a:t>3/02/2016</a:t>
+              <a:t>5/02/2016</a:t>
             </a:fld>
             <a:endParaRPr lang="en-AU"/>
           </a:p>
@@ -3255,7 +3356,7 @@
           <a:p>
             <a:fld id="{A3C1995D-4FFA-4004-9C55-329B9145134D}" type="datetimeFigureOut">
               <a:rPr lang="en-AU" smtClean="0"/>
-              <a:t>3/02/2016</a:t>
+              <a:t>5/02/2016</a:t>
             </a:fld>
             <a:endParaRPr lang="en-AU"/>
           </a:p>
@@ -3943,6 +4044,216 @@
 </p:sld>
 </file>
 
+<file path=ppt/slides/slide4.xml><?xml version="1.0" encoding="utf-8"?>
+<p:sld xmlns:a="http://schemas.openxmlformats.org/drawingml/2006/main" xmlns:r="http://schemas.openxmlformats.org/officeDocument/2006/relationships" xmlns:p="http://schemas.openxmlformats.org/presentationml/2006/main">
+  <p:cSld>
+    <p:spTree>
+      <p:nvGrpSpPr>
+        <p:cNvPr id="1" name=""/>
+        <p:cNvGrpSpPr/>
+        <p:nvPr/>
+      </p:nvGrpSpPr>
+      <p:grpSpPr>
+        <a:xfrm>
+          <a:off x="0" y="0"/>
+          <a:ext cx="0" cy="0"/>
+          <a:chOff x="0" y="0"/>
+          <a:chExt cx="0" cy="0"/>
+        </a:xfrm>
+      </p:grpSpPr>
+      <p:pic>
+        <p:nvPicPr>
+          <p:cNvPr id="2" name="Picture 1"/>
+          <p:cNvPicPr>
+            <a:picLocks noChangeAspect="1"/>
+          </p:cNvPicPr>
+          <p:nvPr/>
+        </p:nvPicPr>
+        <p:blipFill>
+          <a:blip r:embed="rId3">
+            <a:extLst>
+              <a:ext uri="{28A0092B-C50C-407E-A947-70E740481C1C}">
+                <a14:useLocalDpi xmlns:a14="http://schemas.microsoft.com/office/drawing/2010/main" val="0"/>
+              </a:ext>
+            </a:extLst>
+          </a:blip>
+          <a:stretch>
+            <a:fillRect/>
+          </a:stretch>
+        </p:blipFill>
+        <p:spPr>
+          <a:xfrm>
+            <a:off x="209550" y="0"/>
+            <a:ext cx="2160000" cy="2160000"/>
+          </a:xfrm>
+          <a:prstGeom prst="rect">
+            <a:avLst/>
+          </a:prstGeom>
+        </p:spPr>
+      </p:pic>
+      <p:pic>
+        <p:nvPicPr>
+          <p:cNvPr id="3" name="Picture 2"/>
+          <p:cNvPicPr>
+            <a:picLocks noChangeAspect="1"/>
+          </p:cNvPicPr>
+          <p:nvPr/>
+        </p:nvPicPr>
+        <p:blipFill>
+          <a:blip r:embed="rId4">
+            <a:extLst>
+              <a:ext uri="{28A0092B-C50C-407E-A947-70E740481C1C}">
+                <a14:useLocalDpi xmlns:a14="http://schemas.microsoft.com/office/drawing/2010/main" val="0"/>
+              </a:ext>
+            </a:extLst>
+          </a:blip>
+          <a:stretch>
+            <a:fillRect/>
+          </a:stretch>
+        </p:blipFill>
+        <p:spPr>
+          <a:xfrm>
+            <a:off x="2781300" y="0"/>
+            <a:ext cx="2160000" cy="2160000"/>
+          </a:xfrm>
+          <a:prstGeom prst="rect">
+            <a:avLst/>
+          </a:prstGeom>
+        </p:spPr>
+      </p:pic>
+      <p:pic>
+        <p:nvPicPr>
+          <p:cNvPr id="4" name="Picture 3"/>
+          <p:cNvPicPr>
+            <a:picLocks noChangeAspect="1"/>
+          </p:cNvPicPr>
+          <p:nvPr/>
+        </p:nvPicPr>
+        <p:blipFill>
+          <a:blip r:embed="rId5">
+            <a:extLst>
+              <a:ext uri="{28A0092B-C50C-407E-A947-70E740481C1C}">
+                <a14:useLocalDpi xmlns:a14="http://schemas.microsoft.com/office/drawing/2010/main" val="0"/>
+              </a:ext>
+            </a:extLst>
+          </a:blip>
+          <a:stretch>
+            <a:fillRect/>
+          </a:stretch>
+        </p:blipFill>
+        <p:spPr>
+          <a:xfrm>
+            <a:off x="5353050" y="0"/>
+            <a:ext cx="2160000" cy="2160000"/>
+          </a:xfrm>
+          <a:prstGeom prst="rect">
+            <a:avLst/>
+          </a:prstGeom>
+        </p:spPr>
+      </p:pic>
+      <p:pic>
+        <p:nvPicPr>
+          <p:cNvPr id="5" name="Picture 4"/>
+          <p:cNvPicPr>
+            <a:picLocks noChangeAspect="1"/>
+          </p:cNvPicPr>
+          <p:nvPr/>
+        </p:nvPicPr>
+        <p:blipFill>
+          <a:blip r:embed="rId6">
+            <a:extLst>
+              <a:ext uri="{28A0092B-C50C-407E-A947-70E740481C1C}">
+                <a14:useLocalDpi xmlns:a14="http://schemas.microsoft.com/office/drawing/2010/main" val="0"/>
+              </a:ext>
+            </a:extLst>
+          </a:blip>
+          <a:stretch>
+            <a:fillRect/>
+          </a:stretch>
+        </p:blipFill>
+        <p:spPr>
+          <a:xfrm>
+            <a:off x="326438" y="2957513"/>
+            <a:ext cx="2160000" cy="2160000"/>
+          </a:xfrm>
+          <a:prstGeom prst="rect">
+            <a:avLst/>
+          </a:prstGeom>
+        </p:spPr>
+      </p:pic>
+      <p:pic>
+        <p:nvPicPr>
+          <p:cNvPr id="6" name="Picture 5"/>
+          <p:cNvPicPr>
+            <a:picLocks noChangeAspect="1"/>
+          </p:cNvPicPr>
+          <p:nvPr/>
+        </p:nvPicPr>
+        <p:blipFill>
+          <a:blip r:embed="rId7">
+            <a:extLst>
+              <a:ext uri="{28A0092B-C50C-407E-A947-70E740481C1C}">
+                <a14:useLocalDpi xmlns:a14="http://schemas.microsoft.com/office/drawing/2010/main" val="0"/>
+              </a:ext>
+            </a:extLst>
+          </a:blip>
+          <a:stretch>
+            <a:fillRect/>
+          </a:stretch>
+        </p:blipFill>
+        <p:spPr>
+          <a:xfrm>
+            <a:off x="2967038" y="3017250"/>
+            <a:ext cx="2160000" cy="2160000"/>
+          </a:xfrm>
+          <a:prstGeom prst="rect">
+            <a:avLst/>
+          </a:prstGeom>
+        </p:spPr>
+      </p:pic>
+      <p:pic>
+        <p:nvPicPr>
+          <p:cNvPr id="7" name="Picture 6"/>
+          <p:cNvPicPr>
+            <a:picLocks noChangeAspect="1"/>
+          </p:cNvPicPr>
+          <p:nvPr/>
+        </p:nvPicPr>
+        <p:blipFill>
+          <a:blip r:embed="rId8">
+            <a:extLst>
+              <a:ext uri="{28A0092B-C50C-407E-A947-70E740481C1C}">
+                <a14:useLocalDpi xmlns:a14="http://schemas.microsoft.com/office/drawing/2010/main" val="0"/>
+              </a:ext>
+            </a:extLst>
+          </a:blip>
+          <a:stretch>
+            <a:fillRect/>
+          </a:stretch>
+        </p:blipFill>
+        <p:spPr>
+          <a:xfrm>
+            <a:off x="5724525" y="2404828"/>
+            <a:ext cx="2160000" cy="3384844"/>
+          </a:xfrm>
+          <a:prstGeom prst="rect">
+            <a:avLst/>
+          </a:prstGeom>
+        </p:spPr>
+      </p:pic>
+    </p:spTree>
+    <p:extLst>
+      <p:ext uri="{BB962C8B-B14F-4D97-AF65-F5344CB8AC3E}">
+        <p14:creationId xmlns:p14="http://schemas.microsoft.com/office/powerpoint/2010/main" val="3225008429"/>
+      </p:ext>
+    </p:extLst>
+  </p:cSld>
+  <p:clrMapOvr>
+    <a:masterClrMapping/>
+  </p:clrMapOvr>
+</p:sld>
+</file>
+
 <file path=ppt/theme/theme1.xml><?xml version="1.0" encoding="utf-8"?>
 <a:theme xmlns:a="http://schemas.openxmlformats.org/drawingml/2006/main" name="Office Theme">
   <a:themeElements>

</xml_diff>